<commit_message>
Refined code and power point
</commit_message>
<xml_diff>
--- a/ClassWorkReports/Twilio_sharpBugFixing .pptx
+++ b/ClassWorkReports/Twilio_sharpBugFixing .pptx
@@ -7,20 +7,20 @@
   <p:sldIdLst>
     <p:sldId id="256" r:id="rId2"/>
     <p:sldId id="257" r:id="rId3"/>
-    <p:sldId id="270" r:id="rId4"/>
-    <p:sldId id="258" r:id="rId5"/>
-    <p:sldId id="259" r:id="rId6"/>
-    <p:sldId id="260" r:id="rId7"/>
-    <p:sldId id="264" r:id="rId8"/>
-    <p:sldId id="268" r:id="rId9"/>
-    <p:sldId id="266" r:id="rId10"/>
-    <p:sldId id="263" r:id="rId11"/>
-    <p:sldId id="265" r:id="rId12"/>
-    <p:sldId id="267" r:id="rId13"/>
-    <p:sldId id="269" r:id="rId14"/>
-    <p:sldId id="271" r:id="rId15"/>
-    <p:sldId id="272" r:id="rId16"/>
-    <p:sldId id="273" r:id="rId17"/>
+    <p:sldId id="277" r:id="rId4"/>
+    <p:sldId id="259" r:id="rId5"/>
+    <p:sldId id="260" r:id="rId6"/>
+    <p:sldId id="264" r:id="rId7"/>
+    <p:sldId id="268" r:id="rId8"/>
+    <p:sldId id="266" r:id="rId9"/>
+    <p:sldId id="263" r:id="rId10"/>
+    <p:sldId id="265" r:id="rId11"/>
+    <p:sldId id="267" r:id="rId12"/>
+    <p:sldId id="269" r:id="rId13"/>
+    <p:sldId id="271" r:id="rId14"/>
+    <p:sldId id="272" r:id="rId15"/>
+    <p:sldId id="273" r:id="rId16"/>
+    <p:sldId id="275" r:id="rId17"/>
     <p:sldId id="274" r:id="rId18"/>
     <p:sldId id="262" r:id="rId19"/>
   </p:sldIdLst>
@@ -306,7 +306,7 @@
             <a:fld id="{1D8BD707-D9CF-40AE-B4C6-C98DA3205C09}" type="datetimeFigureOut">
               <a:rPr lang="en-US" smtClean="0"/>
               <a:pPr/>
-              <a:t>11/12/2013</a:t>
+              <a:t>11/13/2013</a:t>
             </a:fld>
             <a:endParaRPr lang="en-US"/>
           </a:p>
@@ -473,7 +473,7 @@
             <a:fld id="{1D8BD707-D9CF-40AE-B4C6-C98DA3205C09}" type="datetimeFigureOut">
               <a:rPr lang="en-US" smtClean="0"/>
               <a:pPr/>
-              <a:t>11/12/2013</a:t>
+              <a:t>11/13/2013</a:t>
             </a:fld>
             <a:endParaRPr lang="en-US"/>
           </a:p>
@@ -650,7 +650,7 @@
             <a:fld id="{1D8BD707-D9CF-40AE-B4C6-C98DA3205C09}" type="datetimeFigureOut">
               <a:rPr lang="en-US" smtClean="0"/>
               <a:pPr/>
-              <a:t>11/12/2013</a:t>
+              <a:t>11/13/2013</a:t>
             </a:fld>
             <a:endParaRPr lang="en-US"/>
           </a:p>
@@ -817,7 +817,7 @@
             <a:fld id="{1D8BD707-D9CF-40AE-B4C6-C98DA3205C09}" type="datetimeFigureOut">
               <a:rPr lang="en-US" smtClean="0"/>
               <a:pPr/>
-              <a:t>11/12/2013</a:t>
+              <a:t>11/13/2013</a:t>
             </a:fld>
             <a:endParaRPr lang="en-US"/>
           </a:p>
@@ -1060,7 +1060,7 @@
             <a:fld id="{1D8BD707-D9CF-40AE-B4C6-C98DA3205C09}" type="datetimeFigureOut">
               <a:rPr lang="en-US" smtClean="0"/>
               <a:pPr/>
-              <a:t>11/12/2013</a:t>
+              <a:t>11/13/2013</a:t>
             </a:fld>
             <a:endParaRPr lang="en-US"/>
           </a:p>
@@ -1345,7 +1345,7 @@
             <a:fld id="{1D8BD707-D9CF-40AE-B4C6-C98DA3205C09}" type="datetimeFigureOut">
               <a:rPr lang="en-US" smtClean="0"/>
               <a:pPr/>
-              <a:t>11/12/2013</a:t>
+              <a:t>11/13/2013</a:t>
             </a:fld>
             <a:endParaRPr lang="en-US"/>
           </a:p>
@@ -1764,7 +1764,7 @@
             <a:fld id="{1D8BD707-D9CF-40AE-B4C6-C98DA3205C09}" type="datetimeFigureOut">
               <a:rPr lang="en-US" smtClean="0"/>
               <a:pPr/>
-              <a:t>11/12/2013</a:t>
+              <a:t>11/13/2013</a:t>
             </a:fld>
             <a:endParaRPr lang="en-US"/>
           </a:p>
@@ -1879,7 +1879,7 @@
             <a:fld id="{1D8BD707-D9CF-40AE-B4C6-C98DA3205C09}" type="datetimeFigureOut">
               <a:rPr lang="en-US" smtClean="0"/>
               <a:pPr/>
-              <a:t>11/12/2013</a:t>
+              <a:t>11/13/2013</a:t>
             </a:fld>
             <a:endParaRPr lang="en-US"/>
           </a:p>
@@ -1971,7 +1971,7 @@
             <a:fld id="{1D8BD707-D9CF-40AE-B4C6-C98DA3205C09}" type="datetimeFigureOut">
               <a:rPr lang="en-US" smtClean="0"/>
               <a:pPr/>
-              <a:t>11/12/2013</a:t>
+              <a:t>11/13/2013</a:t>
             </a:fld>
             <a:endParaRPr lang="en-US"/>
           </a:p>
@@ -2245,7 +2245,7 @@
             <a:fld id="{1D8BD707-D9CF-40AE-B4C6-C98DA3205C09}" type="datetimeFigureOut">
               <a:rPr lang="en-US" smtClean="0"/>
               <a:pPr/>
-              <a:t>11/12/2013</a:t>
+              <a:t>11/13/2013</a:t>
             </a:fld>
             <a:endParaRPr lang="en-US"/>
           </a:p>
@@ -2495,7 +2495,7 @@
             <a:fld id="{1D8BD707-D9CF-40AE-B4C6-C98DA3205C09}" type="datetimeFigureOut">
               <a:rPr lang="en-US" smtClean="0"/>
               <a:pPr/>
-              <a:t>11/12/2013</a:t>
+              <a:t>11/13/2013</a:t>
             </a:fld>
             <a:endParaRPr lang="en-US"/>
           </a:p>
@@ -2705,7 +2705,7 @@
             <a:fld id="{1D8BD707-D9CF-40AE-B4C6-C98DA3205C09}" type="datetimeFigureOut">
               <a:rPr lang="en-US" smtClean="0"/>
               <a:pPr/>
-              <a:t>11/12/2013</a:t>
+              <a:t>11/13/2013</a:t>
             </a:fld>
             <a:endParaRPr lang="en-US"/>
           </a:p>
@@ -3170,6 +3170,13 @@
   <p:clrMapOvr>
     <a:masterClrMapping/>
   </p:clrMapOvr>
+  <p:timing>
+    <p:tnLst>
+      <p:par>
+        <p:cTn id="1" dur="indefinite" restart="never" nodeType="tmRoot"/>
+      </p:par>
+    </p:tnLst>
+  </p:timing>
 </p:sld>
 </file>
 
@@ -3208,129 +3215,21 @@
           <a:lstStyle/>
           <a:p>
             <a:r>
-              <a:rPr lang="en-CA" dirty="0" smtClean="0"/>
-              <a:t>First Bug :</a:t>
+              <a:rPr lang="en-CA" b="1" dirty="0" smtClean="0"/>
+              <a:t>First Bug : </a:t>
             </a:r>
             <a:br>
-              <a:rPr lang="en-CA" dirty="0" smtClean="0"/>
+              <a:rPr lang="en-CA" b="1" dirty="0" smtClean="0"/>
             </a:br>
             <a:r>
-              <a:rPr lang="en-CA" dirty="0" smtClean="0"/>
-              <a:t>Code for using </a:t>
-            </a:r>
-            <a:r>
-              <a:rPr lang="en-CA" dirty="0" err="1" smtClean="0"/>
+              <a:rPr lang="en-CA" b="1" dirty="0" err="1" smtClean="0"/>
               <a:t>Twilio</a:t>
             </a:r>
             <a:r>
-              <a:rPr lang="en-CA" dirty="0" smtClean="0"/>
-              <a:t> </a:t>
-            </a:r>
-            <a:r>
-              <a:rPr lang="en-CA" dirty="0" err="1" smtClean="0"/>
-              <a:t>api</a:t>
-            </a:r>
-            <a:r>
-              <a:rPr lang="en-CA" dirty="0" smtClean="0"/>
-              <a:t> send massage </a:t>
-            </a:r>
-            <a:endParaRPr lang="en-CA" dirty="0"/>
-          </a:p>
-        </p:txBody>
-      </p:sp>
-      <p:pic>
-        <p:nvPicPr>
-          <p:cNvPr id="1028" name="Picture 4"/>
-          <p:cNvPicPr>
-            <a:picLocks noGrp="1" noChangeAspect="1" noChangeArrowheads="1"/>
-          </p:cNvPicPr>
-          <p:nvPr>
-            <p:ph idx="1"/>
-          </p:nvPr>
-        </p:nvPicPr>
-        <p:blipFill>
-          <a:blip r:embed="rId2"/>
-          <a:srcRect/>
-          <a:stretch>
-            <a:fillRect/>
-          </a:stretch>
-        </p:blipFill>
-        <p:spPr bwMode="auto">
-          <a:xfrm>
-            <a:off x="1104900" y="1600994"/>
-            <a:ext cx="6934200" cy="4524375"/>
-          </a:xfrm>
-          <a:prstGeom prst="rect">
-            <a:avLst/>
-          </a:prstGeom>
-          <a:noFill/>
-          <a:ln w="9525">
-            <a:noFill/>
-            <a:miter lim="800000"/>
-            <a:headEnd/>
-            <a:tailEnd/>
-          </a:ln>
-          <a:effectLst/>
-        </p:spPr>
-      </p:pic>
-    </p:spTree>
-  </p:cSld>
-  <p:clrMapOvr>
-    <a:masterClrMapping/>
-  </p:clrMapOvr>
-</p:sld>
-</file>
-
-<file path=ppt/slides/slide11.xml><?xml version="1.0" encoding="utf-8"?>
-<p:sld xmlns:a="http://schemas.openxmlformats.org/drawingml/2006/main" xmlns:r="http://schemas.openxmlformats.org/officeDocument/2006/relationships" xmlns:p="http://schemas.openxmlformats.org/presentationml/2006/main">
-  <p:cSld>
-    <p:spTree>
-      <p:nvGrpSpPr>
-        <p:cNvPr id="1" name=""/>
-        <p:cNvGrpSpPr/>
-        <p:nvPr/>
-      </p:nvGrpSpPr>
-      <p:grpSpPr>
-        <a:xfrm>
-          <a:off x="0" y="0"/>
-          <a:ext cx="0" cy="0"/>
-          <a:chOff x="0" y="0"/>
-          <a:chExt cx="0" cy="0"/>
-        </a:xfrm>
-      </p:grpSpPr>
-      <p:sp>
-        <p:nvSpPr>
-          <p:cNvPr id="2" name="Title 1"/>
-          <p:cNvSpPr>
-            <a:spLocks noGrp="1"/>
-          </p:cNvSpPr>
-          <p:nvPr>
-            <p:ph type="title"/>
-          </p:nvPr>
-        </p:nvSpPr>
-        <p:spPr/>
-        <p:txBody>
-          <a:bodyPr>
-            <a:normAutofit fontScale="90000"/>
-          </a:bodyPr>
-          <a:lstStyle/>
-          <a:p>
-            <a:r>
-              <a:rPr lang="en-CA" dirty="0" smtClean="0"/>
-              <a:t>First Bug : </a:t>
-            </a:r>
-            <a:br>
-              <a:rPr lang="en-CA" dirty="0" smtClean="0"/>
-            </a:br>
-            <a:r>
-              <a:rPr lang="en-CA" dirty="0" err="1" smtClean="0"/>
-              <a:t>Twilio</a:t>
-            </a:r>
-            <a:r>
-              <a:rPr lang="en-CA" dirty="0" smtClean="0"/>
+              <a:rPr lang="en-CA" b="1" dirty="0" smtClean="0"/>
               <a:t> core  send massage </a:t>
             </a:r>
-            <a:endParaRPr lang="en-CA" dirty="0"/>
+            <a:endParaRPr lang="en-CA" b="1" dirty="0"/>
           </a:p>
         </p:txBody>
       </p:sp>
@@ -3374,10 +3273,17 @@
   <p:clrMapOvr>
     <a:masterClrMapping/>
   </p:clrMapOvr>
+  <p:timing>
+    <p:tnLst>
+      <p:par>
+        <p:cTn id="1" dur="indefinite" restart="never" nodeType="tmRoot"/>
+      </p:par>
+    </p:tnLst>
+  </p:timing>
 </p:sld>
 </file>
 
-<file path=ppt/slides/slide12.xml><?xml version="1.0" encoding="utf-8"?>
+<file path=ppt/slides/slide11.xml><?xml version="1.0" encoding="utf-8"?>
 <p:sld xmlns:a="http://schemas.openxmlformats.org/drawingml/2006/main" xmlns:r="http://schemas.openxmlformats.org/officeDocument/2006/relationships" xmlns:p="http://schemas.openxmlformats.org/presentationml/2006/main">
   <p:cSld>
     <p:spTree>
@@ -3418,26 +3324,34 @@
           <a:p>
             <a:r>
               <a:rPr lang="en-CA" dirty="0" smtClean="0"/>
-              <a:t> First Bug :</a:t>
+              <a:t> </a:t>
+            </a:r>
+            <a:r>
+              <a:rPr lang="en-CA" b="1" dirty="0" smtClean="0"/>
+              <a:t>First Bug :</a:t>
             </a:r>
             <a:br>
-              <a:rPr lang="en-CA" dirty="0" smtClean="0"/>
+              <a:rPr lang="en-CA" b="1" dirty="0" smtClean="0"/>
             </a:br>
             <a:r>
-              <a:rPr lang="en-CA" dirty="0" err="1" smtClean="0"/>
+              <a:rPr lang="en-CA" b="1" dirty="0" err="1" smtClean="0"/>
               <a:t>RestException</a:t>
             </a:r>
             <a:r>
-              <a:rPr lang="en-CA" dirty="0" smtClean="0"/>
+              <a:rPr lang="en-CA" b="1" dirty="0" smtClean="0"/>
               <a:t> code line in </a:t>
             </a:r>
             <a:r>
-              <a:rPr lang="en-CA" dirty="0" err="1" smtClean="0"/>
+              <a:rPr lang="en-CA" b="1" dirty="0" err="1" smtClean="0"/>
               <a:t>Twilio</a:t>
             </a:r>
             <a:r>
-              <a:rPr lang="en-CA" dirty="0" smtClean="0"/>
+              <a:rPr lang="en-CA" b="1" dirty="0" smtClean="0"/>
               <a:t> core</a:t>
+            </a:r>
+            <a:r>
+              <a:rPr lang="en-CA" dirty="0" smtClean="0"/>
+              <a:t/>
             </a:r>
             <a:br>
               <a:rPr lang="en-CA" dirty="0" smtClean="0"/>
@@ -3486,6 +3400,190 @@
   <p:clrMapOvr>
     <a:masterClrMapping/>
   </p:clrMapOvr>
+  <p:timing>
+    <p:tnLst>
+      <p:par>
+        <p:cTn id="1" dur="indefinite" restart="never" nodeType="tmRoot"/>
+      </p:par>
+    </p:tnLst>
+  </p:timing>
+</p:sld>
+</file>
+
+<file path=ppt/slides/slide12.xml><?xml version="1.0" encoding="utf-8"?>
+<p:sld xmlns:a="http://schemas.openxmlformats.org/drawingml/2006/main" xmlns:r="http://schemas.openxmlformats.org/officeDocument/2006/relationships" xmlns:p="http://schemas.openxmlformats.org/presentationml/2006/main">
+  <p:cSld>
+    <p:spTree>
+      <p:nvGrpSpPr>
+        <p:cNvPr id="1" name=""/>
+        <p:cNvGrpSpPr/>
+        <p:nvPr/>
+      </p:nvGrpSpPr>
+      <p:grpSpPr>
+        <a:xfrm>
+          <a:off x="0" y="0"/>
+          <a:ext cx="0" cy="0"/>
+          <a:chOff x="0" y="0"/>
+          <a:chExt cx="0" cy="0"/>
+        </a:xfrm>
+      </p:grpSpPr>
+      <p:sp>
+        <p:nvSpPr>
+          <p:cNvPr id="2" name="Title 1"/>
+          <p:cNvSpPr>
+            <a:spLocks noGrp="1"/>
+          </p:cNvSpPr>
+          <p:nvPr>
+            <p:ph type="title"/>
+          </p:nvPr>
+        </p:nvSpPr>
+        <p:spPr/>
+        <p:txBody>
+          <a:bodyPr>
+            <a:normAutofit fontScale="90000"/>
+          </a:bodyPr>
+          <a:lstStyle/>
+          <a:p>
+            <a:r>
+              <a:rPr lang="en-CA" b="1" dirty="0" smtClean="0"/>
+              <a:t>First Bug :</a:t>
+            </a:r>
+            <a:br>
+              <a:rPr lang="en-CA" b="1" dirty="0" smtClean="0"/>
+            </a:br>
+            <a:r>
+              <a:rPr lang="en-CA" b="1" dirty="0" smtClean="0"/>
+              <a:t>Root  of </a:t>
+            </a:r>
+            <a:r>
+              <a:rPr lang="en-CA" b="1" dirty="0" err="1" smtClean="0"/>
+              <a:t>deserializes</a:t>
+            </a:r>
+            <a:r>
+              <a:rPr lang="en-CA" b="1" dirty="0" smtClean="0"/>
+              <a:t> </a:t>
+            </a:r>
+            <a:r>
+              <a:rPr lang="en-CA" b="1" dirty="0" err="1" smtClean="0"/>
+              <a:t>RestExceptions</a:t>
+            </a:r>
+            <a:endParaRPr lang="en-CA" b="1" dirty="0"/>
+          </a:p>
+        </p:txBody>
+      </p:sp>
+      <p:sp>
+        <p:nvSpPr>
+          <p:cNvPr id="3" name="Content Placeholder 2"/>
+          <p:cNvSpPr>
+            <a:spLocks noGrp="1"/>
+          </p:cNvSpPr>
+          <p:nvPr>
+            <p:ph idx="1"/>
+          </p:nvPr>
+        </p:nvSpPr>
+        <p:spPr/>
+        <p:txBody>
+          <a:bodyPr/>
+          <a:lstStyle/>
+          <a:p>
+            <a:r>
+              <a:rPr lang="en-CA" dirty="0" smtClean="0"/>
+              <a:t>This issue ,as you see in “</a:t>
+            </a:r>
+            <a:r>
+              <a:rPr lang="en-CA" dirty="0" err="1" smtClean="0"/>
+              <a:t>RestException</a:t>
+            </a:r>
+            <a:r>
+              <a:rPr lang="en-CA" dirty="0" smtClean="0"/>
+              <a:t> code line in </a:t>
+            </a:r>
+            <a:r>
+              <a:rPr lang="en-CA" dirty="0" err="1" smtClean="0"/>
+              <a:t>Twilio</a:t>
+            </a:r>
+            <a:r>
+              <a:rPr lang="en-CA" dirty="0" smtClean="0"/>
+              <a:t>” image, is because of </a:t>
+            </a:r>
+            <a:r>
+              <a:rPr lang="en-CA" dirty="0" err="1" smtClean="0"/>
+              <a:t>RestSharp</a:t>
+            </a:r>
+            <a:r>
+              <a:rPr lang="en-CA" dirty="0" smtClean="0"/>
+              <a:t>  </a:t>
+            </a:r>
+            <a:r>
+              <a:rPr lang="en-CA" dirty="0" err="1" smtClean="0"/>
+              <a:t>Api</a:t>
+            </a:r>
+            <a:r>
+              <a:rPr lang="en-CA" dirty="0" smtClean="0"/>
+              <a:t>  in </a:t>
+            </a:r>
+            <a:r>
+              <a:rPr lang="en-CA" dirty="0" err="1" smtClean="0"/>
+              <a:t>RestSharp.RestRequest</a:t>
+            </a:r>
+            <a:r>
+              <a:rPr lang="en-CA" dirty="0" smtClean="0"/>
+              <a:t>  service that is responsible to serialization and </a:t>
+            </a:r>
+            <a:r>
+              <a:rPr lang="en-CA" dirty="0" err="1" smtClean="0"/>
+              <a:t>deserialization</a:t>
+            </a:r>
+            <a:r>
+              <a:rPr lang="en-CA" dirty="0" smtClean="0"/>
+              <a:t> (is called </a:t>
+            </a:r>
+            <a:r>
+              <a:rPr lang="en-CA" dirty="0" err="1" smtClean="0"/>
+              <a:t>marshall</a:t>
+            </a:r>
+            <a:r>
+              <a:rPr lang="en-CA" dirty="0" smtClean="0"/>
+              <a:t> and </a:t>
+            </a:r>
+            <a:r>
+              <a:rPr lang="en-CA" dirty="0" err="1" smtClean="0"/>
+              <a:t>unmarshal</a:t>
+            </a:r>
+            <a:r>
+              <a:rPr lang="en-CA" dirty="0" smtClean="0"/>
+              <a:t> in java)</a:t>
+            </a:r>
+          </a:p>
+          <a:p>
+            <a:r>
+              <a:rPr lang="en-CA" dirty="0" smtClean="0"/>
+              <a:t>This API is out of this project zoon and this issue is reported as </a:t>
+            </a:r>
+            <a:r>
+              <a:rPr lang="en-CA" dirty="0" err="1" smtClean="0"/>
+              <a:t>RestSharp</a:t>
+            </a:r>
+            <a:r>
+              <a:rPr lang="en-CA" dirty="0" smtClean="0"/>
+              <a:t> Issues by Devin(Core developer)</a:t>
+            </a:r>
+            <a:endParaRPr lang="en-CA" dirty="0"/>
+          </a:p>
+        </p:txBody>
+      </p:sp>
+    </p:spTree>
+  </p:cSld>
+  <p:clrMapOvr>
+    <a:masterClrMapping/>
+  </p:clrMapOvr>
+  <p:timing>
+    <p:tnLst>
+      <p:par>
+        <p:cTn id="1" dur="indefinite" restart="never" nodeType="tmRoot"/>
+      </p:par>
+    </p:tnLst>
+  </p:timing>
 </p:sld>
 </file>
 
@@ -3525,194 +3623,24 @@
           <a:p>
             <a:r>
               <a:rPr lang="en-CA" b="1" dirty="0" smtClean="0"/>
-              <a:t>First Bug :</a:t>
+              <a:t>Second Bug:</a:t>
             </a:r>
             <a:br>
               <a:rPr lang="en-CA" b="1" dirty="0" smtClean="0"/>
             </a:br>
             <a:r>
               <a:rPr lang="en-CA" b="1" dirty="0" smtClean="0"/>
-              <a:t>Root  of </a:t>
+              <a:t>Code for using </a:t>
             </a:r>
             <a:r>
               <a:rPr lang="en-CA" b="1" dirty="0" err="1" smtClean="0"/>
-              <a:t>deserializes</a:t>
+              <a:t>Twilio</a:t>
             </a:r>
             <a:r>
               <a:rPr lang="en-CA" b="1" dirty="0" smtClean="0"/>
-              <a:t> </a:t>
-            </a:r>
-            <a:r>
-              <a:rPr lang="en-CA" b="1" dirty="0" err="1" smtClean="0"/>
-              <a:t>RestExceptions</a:t>
+              <a:t> API </a:t>
             </a:r>
             <a:endParaRPr lang="en-CA" b="1" dirty="0"/>
-          </a:p>
-        </p:txBody>
-      </p:sp>
-      <p:sp>
-        <p:nvSpPr>
-          <p:cNvPr id="3" name="Content Placeholder 2"/>
-          <p:cNvSpPr>
-            <a:spLocks noGrp="1"/>
-          </p:cNvSpPr>
-          <p:nvPr>
-            <p:ph idx="1"/>
-          </p:nvPr>
-        </p:nvSpPr>
-        <p:spPr/>
-        <p:txBody>
-          <a:bodyPr/>
-          <a:lstStyle/>
-          <a:p>
-            <a:r>
-              <a:rPr lang="en-CA" dirty="0" smtClean="0"/>
-              <a:t>This issue ,as you see in “</a:t>
-            </a:r>
-            <a:r>
-              <a:rPr lang="en-CA" dirty="0" err="1" smtClean="0"/>
-              <a:t>RestException</a:t>
-            </a:r>
-            <a:r>
-              <a:rPr lang="en-CA" dirty="0" smtClean="0"/>
-              <a:t> code line in </a:t>
-            </a:r>
-            <a:r>
-              <a:rPr lang="en-CA" dirty="0" err="1" smtClean="0"/>
-              <a:t>Twilio</a:t>
-            </a:r>
-            <a:r>
-              <a:rPr lang="en-CA" dirty="0" smtClean="0"/>
-              <a:t>” image, is because of </a:t>
-            </a:r>
-            <a:r>
-              <a:rPr lang="en-CA" dirty="0" err="1" smtClean="0"/>
-              <a:t>RestSharp</a:t>
-            </a:r>
-            <a:r>
-              <a:rPr lang="en-CA" dirty="0" smtClean="0"/>
-              <a:t>  </a:t>
-            </a:r>
-            <a:r>
-              <a:rPr lang="en-CA" dirty="0" err="1" smtClean="0"/>
-              <a:t>Api</a:t>
-            </a:r>
-            <a:r>
-              <a:rPr lang="en-CA" dirty="0" smtClean="0"/>
-              <a:t>  in </a:t>
-            </a:r>
-            <a:r>
-              <a:rPr lang="en-CA" dirty="0" err="1" smtClean="0"/>
-              <a:t>RestSharp.RestRequest</a:t>
-            </a:r>
-            <a:r>
-              <a:rPr lang="en-CA" dirty="0" smtClean="0"/>
-              <a:t>  service that is responsible to serialization and </a:t>
-            </a:r>
-            <a:r>
-              <a:rPr lang="en-CA" dirty="0" err="1" smtClean="0"/>
-              <a:t>deserialization</a:t>
-            </a:r>
-            <a:r>
-              <a:rPr lang="en-CA" dirty="0" smtClean="0"/>
-              <a:t> (is called </a:t>
-            </a:r>
-            <a:r>
-              <a:rPr lang="en-CA" dirty="0" err="1" smtClean="0"/>
-              <a:t>marshall</a:t>
-            </a:r>
-            <a:r>
-              <a:rPr lang="en-CA" dirty="0" smtClean="0"/>
-              <a:t> and </a:t>
-            </a:r>
-            <a:r>
-              <a:rPr lang="en-CA" dirty="0" err="1" smtClean="0"/>
-              <a:t>unmarshal</a:t>
-            </a:r>
-            <a:r>
-              <a:rPr lang="en-CA" dirty="0" smtClean="0"/>
-              <a:t> in java)</a:t>
-            </a:r>
-          </a:p>
-          <a:p>
-            <a:r>
-              <a:rPr lang="en-CA" dirty="0" smtClean="0"/>
-              <a:t>This API is out of this project zoon and this issue is reported as </a:t>
-            </a:r>
-            <a:r>
-              <a:rPr lang="en-CA" dirty="0" err="1" smtClean="0"/>
-              <a:t>RestSharp</a:t>
-            </a:r>
-            <a:r>
-              <a:rPr lang="en-CA" dirty="0" smtClean="0"/>
-              <a:t> Issues by Devin(Core developer)</a:t>
-            </a:r>
-            <a:endParaRPr lang="en-CA" dirty="0"/>
-          </a:p>
-        </p:txBody>
-      </p:sp>
-    </p:spTree>
-  </p:cSld>
-  <p:clrMapOvr>
-    <a:masterClrMapping/>
-  </p:clrMapOvr>
-</p:sld>
-</file>
-
-<file path=ppt/slides/slide14.xml><?xml version="1.0" encoding="utf-8"?>
-<p:sld xmlns:a="http://schemas.openxmlformats.org/drawingml/2006/main" xmlns:r="http://schemas.openxmlformats.org/officeDocument/2006/relationships" xmlns:p="http://schemas.openxmlformats.org/presentationml/2006/main">
-  <p:cSld>
-    <p:spTree>
-      <p:nvGrpSpPr>
-        <p:cNvPr id="1" name=""/>
-        <p:cNvGrpSpPr/>
-        <p:nvPr/>
-      </p:nvGrpSpPr>
-      <p:grpSpPr>
-        <a:xfrm>
-          <a:off x="0" y="0"/>
-          <a:ext cx="0" cy="0"/>
-          <a:chOff x="0" y="0"/>
-          <a:chExt cx="0" cy="0"/>
-        </a:xfrm>
-      </p:grpSpPr>
-      <p:sp>
-        <p:nvSpPr>
-          <p:cNvPr id="2" name="Title 1"/>
-          <p:cNvSpPr>
-            <a:spLocks noGrp="1"/>
-          </p:cNvSpPr>
-          <p:nvPr>
-            <p:ph type="title"/>
-          </p:nvPr>
-        </p:nvSpPr>
-        <p:spPr/>
-        <p:txBody>
-          <a:bodyPr>
-            <a:normAutofit fontScale="90000"/>
-          </a:bodyPr>
-          <a:lstStyle/>
-          <a:p>
-            <a:r>
-              <a:rPr lang="en-CA" dirty="0" smtClean="0"/>
-              <a:t>Second Bug:</a:t>
-            </a:r>
-            <a:br>
-              <a:rPr lang="en-CA" dirty="0" smtClean="0"/>
-            </a:br>
-            <a:r>
-              <a:rPr lang="en-CA" dirty="0" smtClean="0"/>
-              <a:t>Code for using </a:t>
-            </a:r>
-            <a:r>
-              <a:rPr lang="en-CA" dirty="0" err="1" smtClean="0"/>
-              <a:t>Twilio</a:t>
-            </a:r>
-            <a:r>
-              <a:rPr lang="en-CA" dirty="0" smtClean="0"/>
-              <a:t> API to create queue</a:t>
-            </a:r>
-            <a:endParaRPr lang="en-CA" dirty="0"/>
           </a:p>
         </p:txBody>
       </p:sp>
@@ -3756,6 +3684,120 @@
   <p:clrMapOvr>
     <a:masterClrMapping/>
   </p:clrMapOvr>
+  <p:timing>
+    <p:tnLst>
+      <p:par>
+        <p:cTn id="1" dur="indefinite" restart="never" nodeType="tmRoot"/>
+      </p:par>
+    </p:tnLst>
+  </p:timing>
+</p:sld>
+</file>
+
+<file path=ppt/slides/slide14.xml><?xml version="1.0" encoding="utf-8"?>
+<p:sld xmlns:a="http://schemas.openxmlformats.org/drawingml/2006/main" xmlns:r="http://schemas.openxmlformats.org/officeDocument/2006/relationships" xmlns:p="http://schemas.openxmlformats.org/presentationml/2006/main">
+  <p:cSld>
+    <p:spTree>
+      <p:nvGrpSpPr>
+        <p:cNvPr id="1" name=""/>
+        <p:cNvGrpSpPr/>
+        <p:nvPr/>
+      </p:nvGrpSpPr>
+      <p:grpSpPr>
+        <a:xfrm>
+          <a:off x="0" y="0"/>
+          <a:ext cx="0" cy="0"/>
+          <a:chOff x="0" y="0"/>
+          <a:chExt cx="0" cy="0"/>
+        </a:xfrm>
+      </p:grpSpPr>
+      <p:sp>
+        <p:nvSpPr>
+          <p:cNvPr id="2" name="Title 1"/>
+          <p:cNvSpPr>
+            <a:spLocks noGrp="1"/>
+          </p:cNvSpPr>
+          <p:nvPr>
+            <p:ph type="title"/>
+          </p:nvPr>
+        </p:nvSpPr>
+        <p:spPr/>
+        <p:txBody>
+          <a:bodyPr>
+            <a:normAutofit fontScale="90000"/>
+          </a:bodyPr>
+          <a:lstStyle/>
+          <a:p>
+            <a:r>
+              <a:rPr lang="en-CA" b="1" dirty="0" smtClean="0"/>
+              <a:t>Second Bug:</a:t>
+            </a:r>
+            <a:br>
+              <a:rPr lang="en-CA" b="1" dirty="0" smtClean="0"/>
+            </a:br>
+            <a:r>
+              <a:rPr lang="en-CA" b="1" dirty="0" smtClean="0"/>
+              <a:t>Core </a:t>
+            </a:r>
+            <a:r>
+              <a:rPr lang="en-CA" b="1" dirty="0" err="1" smtClean="0"/>
+              <a:t>CreateQueue</a:t>
+            </a:r>
+            <a:r>
+              <a:rPr lang="en-CA" b="1" dirty="0" smtClean="0"/>
+              <a:t> first overload</a:t>
+            </a:r>
+            <a:endParaRPr lang="en-CA" b="1" dirty="0"/>
+          </a:p>
+        </p:txBody>
+      </p:sp>
+      <p:pic>
+        <p:nvPicPr>
+          <p:cNvPr id="2051" name="Picture 3"/>
+          <p:cNvPicPr>
+            <a:picLocks noGrp="1" noChangeAspect="1" noChangeArrowheads="1"/>
+          </p:cNvPicPr>
+          <p:nvPr>
+            <p:ph idx="1"/>
+          </p:nvPr>
+        </p:nvPicPr>
+        <p:blipFill>
+          <a:blip r:embed="rId2"/>
+          <a:srcRect/>
+          <a:stretch>
+            <a:fillRect/>
+          </a:stretch>
+        </p:blipFill>
+        <p:spPr bwMode="auto">
+          <a:xfrm>
+            <a:off x="1519237" y="2134394"/>
+            <a:ext cx="6105525" cy="3457575"/>
+          </a:xfrm>
+          <a:prstGeom prst="rect">
+            <a:avLst/>
+          </a:prstGeom>
+          <a:noFill/>
+          <a:ln w="9525">
+            <a:noFill/>
+            <a:miter lim="800000"/>
+            <a:headEnd/>
+            <a:tailEnd/>
+          </a:ln>
+          <a:effectLst/>
+        </p:spPr>
+      </p:pic>
+    </p:spTree>
+  </p:cSld>
+  <p:clrMapOvr>
+    <a:masterClrMapping/>
+  </p:clrMapOvr>
+  <p:timing>
+    <p:tnLst>
+      <p:par>
+        <p:cTn id="1" dur="indefinite" restart="never" nodeType="tmRoot"/>
+      </p:par>
+    </p:tnLst>
+  </p:timing>
 </p:sld>
 </file>
 
@@ -3810,7 +3852,7 @@
             </a:r>
             <a:r>
               <a:rPr lang="en-CA" b="1" dirty="0" smtClean="0"/>
-              <a:t> first overload</a:t>
+              <a:t> second overload</a:t>
             </a:r>
             <a:endParaRPr lang="en-CA" b="1" dirty="0"/>
           </a:p>
@@ -3818,7 +3860,7 @@
       </p:sp>
       <p:pic>
         <p:nvPicPr>
-          <p:cNvPr id="2051" name="Picture 3"/>
+          <p:cNvPr id="3074" name="Picture 2"/>
           <p:cNvPicPr>
             <a:picLocks noGrp="1" noChangeAspect="1" noChangeArrowheads="1"/>
           </p:cNvPicPr>
@@ -3835,8 +3877,8 @@
         </p:blipFill>
         <p:spPr bwMode="auto">
           <a:xfrm>
-            <a:off x="1519237" y="2134394"/>
-            <a:ext cx="6105525" cy="3457575"/>
+            <a:off x="1433512" y="2129631"/>
+            <a:ext cx="6276975" cy="3467100"/>
           </a:xfrm>
           <a:prstGeom prst="rect">
             <a:avLst/>
@@ -3901,31 +3943,27 @@
           <a:lstStyle/>
           <a:p>
             <a:r>
-              <a:rPr lang="en-CA" dirty="0" smtClean="0"/>
+              <a:rPr lang="en-CA" b="1" dirty="0" smtClean="0"/>
               <a:t>Second Bug:</a:t>
             </a:r>
+            <a:r>
+              <a:rPr lang="en-CA" dirty="0" smtClean="0"/>
+              <a:t/>
+            </a:r>
             <a:br>
               <a:rPr lang="en-CA" dirty="0" smtClean="0"/>
             </a:br>
             <a:r>
-              <a:rPr lang="en-CA" dirty="0" smtClean="0"/>
-              <a:t>Core </a:t>
-            </a:r>
-            <a:r>
-              <a:rPr lang="en-CA" dirty="0" err="1" smtClean="0"/>
-              <a:t>CreateQueue</a:t>
-            </a:r>
-            <a:r>
-              <a:rPr lang="en-CA" dirty="0" smtClean="0"/>
-              <a:t> second overload</a:t>
-            </a:r>
-            <a:endParaRPr lang="en-CA" dirty="0"/>
+              <a:rPr lang="en-CA" b="1" dirty="0" smtClean="0"/>
+              <a:t>Solution(Argument Exception)  </a:t>
+            </a:r>
+            <a:endParaRPr lang="en-CA" b="1" dirty="0"/>
           </a:p>
         </p:txBody>
       </p:sp>
       <p:pic>
         <p:nvPicPr>
-          <p:cNvPr id="3074" name="Picture 2"/>
+          <p:cNvPr id="1026" name="Picture 2"/>
           <p:cNvPicPr>
             <a:picLocks noGrp="1" noChangeAspect="1" noChangeArrowheads="1"/>
           </p:cNvPicPr>
@@ -3942,8 +3980,8 @@
         </p:blipFill>
         <p:spPr bwMode="auto">
           <a:xfrm>
-            <a:off x="1433512" y="2129631"/>
-            <a:ext cx="6276975" cy="3467100"/>
+            <a:off x="576262" y="2124869"/>
+            <a:ext cx="7991475" cy="3476625"/>
           </a:xfrm>
           <a:prstGeom prst="rect">
             <a:avLst/>
@@ -3963,13 +4001,6 @@
   <p:clrMapOvr>
     <a:masterClrMapping/>
   </p:clrMapOvr>
-  <p:timing>
-    <p:tnLst>
-      <p:par>
-        <p:cTn id="1" dur="indefinite" restart="never" nodeType="tmRoot"/>
-      </p:par>
-    </p:tnLst>
-  </p:timing>
 </p:sld>
 </file>
 
@@ -4008,17 +4039,17 @@
           <a:lstStyle/>
           <a:p>
             <a:r>
-              <a:rPr lang="en-CA" dirty="0" smtClean="0"/>
+              <a:rPr lang="en-CA" b="1" dirty="0" smtClean="0"/>
               <a:t>Second Bug:</a:t>
             </a:r>
             <a:br>
-              <a:rPr lang="en-CA" dirty="0" smtClean="0"/>
+              <a:rPr lang="en-CA" b="1" dirty="0" smtClean="0"/>
             </a:br>
             <a:r>
-              <a:rPr lang="en-CA" dirty="0" smtClean="0"/>
-              <a:t>Root Issue</a:t>
-            </a:r>
-            <a:endParaRPr lang="en-CA" dirty="0"/>
+              <a:rPr lang="en-CA" b="1" dirty="0" smtClean="0"/>
+              <a:t>Root Issue and solution </a:t>
+            </a:r>
+            <a:endParaRPr lang="en-CA" b="1" dirty="0"/>
           </a:p>
         </p:txBody>
       </p:sp>
@@ -4244,10 +4275,10 @@
           <a:lstStyle/>
           <a:p>
             <a:r>
-              <a:rPr lang="en-CA" dirty="0" smtClean="0"/>
+              <a:rPr lang="en-CA" b="1" dirty="0" smtClean="0"/>
               <a:t>Work steps </a:t>
             </a:r>
-            <a:endParaRPr lang="en-CA" dirty="0"/>
+            <a:endParaRPr lang="en-CA" b="1" dirty="0"/>
           </a:p>
         </p:txBody>
       </p:sp>
@@ -4333,6 +4364,13 @@
   <p:clrMapOvr>
     <a:masterClrMapping/>
   </p:clrMapOvr>
+  <p:timing>
+    <p:tnLst>
+      <p:par>
+        <p:cTn id="1" dur="indefinite" restart="never" nodeType="tmRoot"/>
+      </p:par>
+    </p:tnLst>
+  </p:timing>
 </p:sld>
 </file>
 
@@ -4428,11 +4466,7 @@
             </a:r>
             <a:r>
               <a:rPr lang="en-CA" dirty="0" smtClean="0"/>
-              <a:t> overloads cause </a:t>
-            </a:r>
-            <a:r>
-              <a:rPr lang="en-CA" dirty="0" smtClean="0"/>
-              <a:t>confusion</a:t>
+              <a:t> overloads cause confusion</a:t>
             </a:r>
           </a:p>
           <a:p>
@@ -4493,79 +4527,100 @@
         </p:nvSpPr>
         <p:spPr/>
         <p:txBody>
+          <a:bodyPr/>
+          <a:lstStyle/>
+          <a:p>
+            <a:r>
+              <a:rPr lang="en-CA" b="1" dirty="0" smtClean="0"/>
+              <a:t>Project Architecture </a:t>
+            </a:r>
+          </a:p>
+        </p:txBody>
+      </p:sp>
+      <p:sp>
+        <p:nvSpPr>
+          <p:cNvPr id="3" name="Content Placeholder 2"/>
+          <p:cNvSpPr>
+            <a:spLocks noGrp="1"/>
+          </p:cNvSpPr>
+          <p:nvPr>
+            <p:ph idx="1"/>
+          </p:nvPr>
+        </p:nvSpPr>
+        <p:spPr/>
+        <p:txBody>
           <a:bodyPr>
-            <a:normAutofit fontScale="90000"/>
+            <a:normAutofit fontScale="85000" lnSpcReduction="10000"/>
           </a:bodyPr>
           <a:lstStyle/>
           <a:p>
             <a:r>
-              <a:rPr lang="en-CA" b="1" dirty="0" smtClean="0"/>
-              <a:t>Finding a project with proper committers and commits</a:t>
-            </a:r>
-            <a:r>
-              <a:rPr lang="en-CA" dirty="0" smtClean="0"/>
-              <a:t/>
-            </a:r>
-            <a:br>
-              <a:rPr lang="en-CA" dirty="0" smtClean="0"/>
-            </a:br>
-            <a:endParaRPr lang="en-CA" dirty="0"/>
-          </a:p>
-        </p:txBody>
-      </p:sp>
-      <p:sp>
-        <p:nvSpPr>
-          <p:cNvPr id="3" name="Content Placeholder 2"/>
-          <p:cNvSpPr>
-            <a:spLocks noGrp="1"/>
-          </p:cNvSpPr>
-          <p:nvPr>
-            <p:ph idx="1"/>
-          </p:nvPr>
-        </p:nvSpPr>
-        <p:spPr/>
-        <p:txBody>
-          <a:bodyPr>
-            <a:normAutofit lnSpcReduction="10000"/>
-          </a:bodyPr>
-          <a:lstStyle/>
-          <a:p>
-            <a:r>
-              <a:rPr lang="en-CA" dirty="0" smtClean="0"/>
-              <a:t>For this mean I searched on following 3 repository and after download of the project and survey on metrics of the project , committers , commits, and technique hired by project I choose Twillio-sharp</a:t>
-            </a:r>
-          </a:p>
-          <a:p>
-            <a:r>
-              <a:rPr lang="en-CA" dirty="0" smtClean="0"/>
-              <a:t>Repository list</a:t>
+              <a:rPr lang="en-CA" dirty="0" smtClean="0"/>
+              <a:t>In this part I find out Twillio-sharp solution consist of 8  projects in following category </a:t>
+            </a:r>
+          </a:p>
+          <a:p>
+            <a:r>
+              <a:rPr lang="en-CA" dirty="0" smtClean="0"/>
+              <a:t>Project category </a:t>
             </a:r>
           </a:p>
           <a:p>
             <a:pPr lvl="1"/>
             <a:r>
+              <a:rPr lang="en-CA" dirty="0" smtClean="0"/>
+              <a:t>Some of project related to project test</a:t>
+            </a:r>
+          </a:p>
+          <a:p>
+            <a:pPr lvl="1"/>
+            <a:r>
+              <a:rPr lang="en-CA" dirty="0" smtClean="0"/>
+              <a:t>Some of project were developed in different framework such as : </a:t>
+            </a:r>
+            <a:r>
               <a:rPr lang="en-CA" dirty="0" err="1" smtClean="0"/>
-              <a:t>GitHub</a:t>
-            </a:r>
-            <a:endParaRPr lang="en-CA" dirty="0" smtClean="0"/>
-          </a:p>
-          <a:p>
-            <a:pPr lvl="1"/>
+              <a:t>Silverlight</a:t>
+            </a:r>
+            <a:r>
+              <a:rPr lang="en-CA" dirty="0" smtClean="0"/>
+              <a:t>, </a:t>
+            </a:r>
             <a:r>
               <a:rPr lang="en-CA" dirty="0" err="1" smtClean="0"/>
-              <a:t>Sourceforge</a:t>
-            </a:r>
-            <a:endParaRPr lang="en-CA" dirty="0" smtClean="0"/>
-          </a:p>
-          <a:p>
-            <a:pPr lvl="1"/>
+              <a:t>WindowsPhone</a:t>
+            </a:r>
+            <a:r>
+              <a:rPr lang="en-CA" dirty="0" smtClean="0"/>
+              <a:t>, </a:t>
+            </a:r>
             <a:r>
               <a:rPr lang="en-CA" dirty="0" err="1" smtClean="0"/>
-              <a:t>Google.Code</a:t>
-            </a:r>
-            <a:r>
-              <a:rPr lang="en-CA" dirty="0" smtClean="0"/>
-              <a:t> </a:t>
+              <a:t>WebMatrix</a:t>
+            </a:r>
+            <a:r>
+              <a:rPr lang="en-CA" dirty="0" smtClean="0"/>
+              <a:t>,...</a:t>
+            </a:r>
+          </a:p>
+          <a:p>
+            <a:r>
+              <a:rPr lang="en-CA" dirty="0" smtClean="0"/>
+              <a:t> My concentrate project Twillio.API which is developed in c# framework and class </a:t>
+            </a:r>
+          </a:p>
+          <a:p>
+            <a:r>
+              <a:rPr lang="en-CA" dirty="0" smtClean="0"/>
+              <a:t>You can find diagram of solution and project level view of architecture in: SOEN691_AZIZI\</a:t>
+            </a:r>
+            <a:r>
+              <a:rPr lang="en-CA" dirty="0" err="1" smtClean="0"/>
+              <a:t>Architector</a:t>
+            </a:r>
+            <a:r>
+              <a:rPr lang="en-CA" dirty="0" smtClean="0"/>
+              <a:t>\solution_projects.png</a:t>
             </a:r>
             <a:endParaRPr lang="en-CA" dirty="0"/>
           </a:p>
@@ -4576,6 +4631,13 @@
   <p:clrMapOvr>
     <a:masterClrMapping/>
   </p:clrMapOvr>
+  <p:timing>
+    <p:tnLst>
+      <p:par>
+        <p:cTn id="1" dur="indefinite" restart="never" nodeType="tmRoot"/>
+      </p:par>
+    </p:tnLst>
+  </p:timing>
 </p:sld>
 </file>
 
@@ -4612,9 +4674,10 @@
           <a:lstStyle/>
           <a:p>
             <a:r>
-              <a:rPr lang="en-CA" dirty="0" smtClean="0"/>
-              <a:t>Project Architecture </a:t>
-            </a:r>
+              <a:rPr lang="en-CA" b="1" dirty="0" smtClean="0"/>
+              <a:t>Twilio.api class diagram</a:t>
+            </a:r>
+            <a:endParaRPr lang="en-CA" b="1" dirty="0"/>
           </a:p>
         </p:txBody>
       </p:sp>
@@ -4630,70 +4693,26 @@
         </p:nvSpPr>
         <p:spPr/>
         <p:txBody>
-          <a:bodyPr>
-            <a:normAutofit fontScale="85000" lnSpcReduction="10000"/>
-          </a:bodyPr>
-          <a:lstStyle/>
-          <a:p>
-            <a:r>
-              <a:rPr lang="en-CA" dirty="0" smtClean="0"/>
-              <a:t>In this part I find out Twillio-sharp solution consist of 8  projects in following category </a:t>
-            </a:r>
-          </a:p>
-          <a:p>
-            <a:r>
-              <a:rPr lang="en-CA" dirty="0" smtClean="0"/>
-              <a:t>Project category </a:t>
-            </a:r>
-          </a:p>
-          <a:p>
-            <a:pPr lvl="1"/>
-            <a:r>
-              <a:rPr lang="en-CA" dirty="0" smtClean="0"/>
-              <a:t>Some of project related to project test</a:t>
-            </a:r>
-          </a:p>
-          <a:p>
-            <a:pPr lvl="1"/>
-            <a:r>
-              <a:rPr lang="en-CA" dirty="0" smtClean="0"/>
-              <a:t>Some of project were developed in different framework such as : </a:t>
+          <a:bodyPr/>
+          <a:lstStyle/>
+          <a:p>
+            <a:r>
+              <a:rPr lang="en-CA" dirty="0" smtClean="0"/>
+              <a:t>Twilio.api is concentrated project between 8 projects</a:t>
+            </a:r>
+          </a:p>
+          <a:p>
+            <a:r>
+              <a:rPr lang="en-CA" dirty="0" smtClean="0"/>
+              <a:t>The information is gathering about it  such as class diagram that you can find it in following </a:t>
             </a:r>
             <a:r>
               <a:rPr lang="en-CA" dirty="0" err="1" smtClean="0"/>
-              <a:t>Silverlight</a:t>
-            </a:r>
-            <a:r>
-              <a:rPr lang="en-CA" dirty="0" smtClean="0"/>
-              <a:t>, </a:t>
-            </a:r>
-            <a:r>
-              <a:rPr lang="en-CA" dirty="0" err="1" smtClean="0"/>
-              <a:t>WindowsPhone</a:t>
-            </a:r>
-            <a:r>
-              <a:rPr lang="en-CA" dirty="0" smtClean="0"/>
-              <a:t>, </a:t>
-            </a:r>
-            <a:r>
-              <a:rPr lang="en-CA" dirty="0" err="1" smtClean="0"/>
-              <a:t>WebMatrix</a:t>
-            </a:r>
-            <a:r>
-              <a:rPr lang="en-CA" dirty="0" smtClean="0"/>
-              <a:t>,...</a:t>
-            </a:r>
-          </a:p>
-          <a:p>
-            <a:r>
-              <a:rPr lang="en-CA" dirty="0" smtClean="0"/>
-              <a:t> My concentrate project Twillio.API which is developed in c# framework and class </a:t>
-            </a:r>
-          </a:p>
-          <a:p>
-            <a:r>
-              <a:rPr lang="en-CA" dirty="0" smtClean="0"/>
-              <a:t>You can find diagram of solution and project level view of architecture in: SOEN691_AZIZI\</a:t>
+              <a:t>adress</a:t>
+            </a:r>
+            <a:r>
+              <a:rPr lang="en-CA" dirty="0" smtClean="0"/>
+              <a:t>:  SOEN691_AZIZI\</a:t>
             </a:r>
             <a:r>
               <a:rPr lang="en-CA" dirty="0" err="1" smtClean="0"/>
@@ -4701,7 +4720,7 @@
             </a:r>
             <a:r>
               <a:rPr lang="en-CA" dirty="0" smtClean="0"/>
-              <a:t>\solution_projects.png</a:t>
+              <a:t>\TwillioAPIClassDiagram.png</a:t>
             </a:r>
             <a:endParaRPr lang="en-CA" dirty="0"/>
           </a:p>
@@ -4712,6 +4731,13 @@
   <p:clrMapOvr>
     <a:masterClrMapping/>
   </p:clrMapOvr>
+  <p:timing>
+    <p:tnLst>
+      <p:par>
+        <p:cTn id="1" dur="indefinite" restart="never" nodeType="tmRoot"/>
+      </p:par>
+    </p:tnLst>
+  </p:timing>
 </p:sld>
 </file>
 
@@ -4748,10 +4774,10 @@
           <a:lstStyle/>
           <a:p>
             <a:r>
-              <a:rPr lang="en-CA" dirty="0" smtClean="0"/>
-              <a:t>Twilio.api class diagram</a:t>
-            </a:r>
-            <a:endParaRPr lang="en-CA" dirty="0"/>
+              <a:rPr lang="en-CA" b="1" dirty="0" smtClean="0"/>
+              <a:t>Find out why bug exist</a:t>
+            </a:r>
+            <a:endParaRPr lang="en-CA" b="1" dirty="0"/>
           </a:p>
         </p:txBody>
       </p:sp>
@@ -4772,30 +4798,81 @@
           <a:p>
             <a:r>
               <a:rPr lang="en-CA" dirty="0" smtClean="0"/>
-              <a:t>Twilio.api is concentrated project between 8 projects</a:t>
-            </a:r>
-          </a:p>
-          <a:p>
-            <a:r>
-              <a:rPr lang="en-CA" dirty="0" smtClean="0"/>
-              <a:t>The information is gathering about it  such as class diagram that you can find it in following </a:t>
+              <a:t>Steps to find </a:t>
+            </a:r>
+          </a:p>
+          <a:p>
+            <a:pPr lvl="1"/>
+            <a:r>
+              <a:rPr lang="en-CA" dirty="0" smtClean="0"/>
+              <a:t> Get an ACCOUNT SID and phone number from </a:t>
             </a:r>
             <a:r>
               <a:rPr lang="en-CA" dirty="0" err="1" smtClean="0"/>
-              <a:t>adress</a:t>
-            </a:r>
-            <a:r>
-              <a:rPr lang="en-CA" dirty="0" smtClean="0"/>
-              <a:t>:  SOEN691_AZIZI\</a:t>
+              <a:t>Twilio</a:t>
+            </a:r>
+            <a:r>
+              <a:rPr lang="en-CA" dirty="0" smtClean="0"/>
+              <a:t> </a:t>
+            </a:r>
+          </a:p>
+          <a:p>
+            <a:pPr lvl="1"/>
+            <a:r>
+              <a:rPr lang="en-CA" dirty="0" smtClean="0"/>
+              <a:t>Make a new project and add </a:t>
             </a:r>
             <a:r>
               <a:rPr lang="en-CA" dirty="0" err="1" smtClean="0"/>
-              <a:t>Architector</a:t>
-            </a:r>
-            <a:r>
-              <a:rPr lang="en-CA" dirty="0" smtClean="0"/>
-              <a:t>\TwillioAPIClassDiagram.png</a:t>
-            </a:r>
+              <a:t>twillio</a:t>
+            </a:r>
+            <a:r>
+              <a:rPr lang="en-CA" dirty="0" smtClean="0"/>
+              <a:t> </a:t>
+            </a:r>
+            <a:r>
+              <a:rPr lang="en-CA" dirty="0" err="1" smtClean="0"/>
+              <a:t>NuGet</a:t>
+            </a:r>
+            <a:r>
+              <a:rPr lang="en-CA" dirty="0" smtClean="0"/>
+              <a:t> </a:t>
+            </a:r>
+          </a:p>
+          <a:p>
+            <a:pPr lvl="1"/>
+            <a:r>
+              <a:rPr lang="en-CA" dirty="0" smtClean="0"/>
+              <a:t>Writing the code to call or message </a:t>
+            </a:r>
+          </a:p>
+          <a:p>
+            <a:pPr lvl="1"/>
+            <a:r>
+              <a:rPr lang="en-CA" dirty="0" smtClean="0"/>
+              <a:t>Build and run </a:t>
+            </a:r>
+          </a:p>
+          <a:p>
+            <a:pPr lvl="1"/>
+            <a:r>
+              <a:rPr lang="en-CA" dirty="0" smtClean="0"/>
+              <a:t>Trace code and finding issue</a:t>
+            </a:r>
+          </a:p>
+          <a:p>
+            <a:pPr lvl="1"/>
+            <a:r>
+              <a:rPr lang="en-CA" dirty="0" smtClean="0"/>
+              <a:t>You can see these steps in following images </a:t>
+            </a:r>
+          </a:p>
+          <a:p>
+            <a:pPr lvl="1"/>
+            <a:endParaRPr lang="en-CA" dirty="0" smtClean="0"/>
+          </a:p>
+          <a:p>
+            <a:pPr lvl="1"/>
             <a:endParaRPr lang="en-CA" dirty="0"/>
           </a:p>
         </p:txBody>
@@ -4805,154 +4882,17 @@
   <p:clrMapOvr>
     <a:masterClrMapping/>
   </p:clrMapOvr>
+  <p:timing>
+    <p:tnLst>
+      <p:par>
+        <p:cTn id="1" dur="indefinite" restart="never" nodeType="tmRoot"/>
+      </p:par>
+    </p:tnLst>
+  </p:timing>
 </p:sld>
 </file>
 
 <file path=ppt/slides/slide7.xml><?xml version="1.0" encoding="utf-8"?>
-<p:sld xmlns:a="http://schemas.openxmlformats.org/drawingml/2006/main" xmlns:r="http://schemas.openxmlformats.org/officeDocument/2006/relationships" xmlns:p="http://schemas.openxmlformats.org/presentationml/2006/main">
-  <p:cSld>
-    <p:spTree>
-      <p:nvGrpSpPr>
-        <p:cNvPr id="1" name=""/>
-        <p:cNvGrpSpPr/>
-        <p:nvPr/>
-      </p:nvGrpSpPr>
-      <p:grpSpPr>
-        <a:xfrm>
-          <a:off x="0" y="0"/>
-          <a:ext cx="0" cy="0"/>
-          <a:chOff x="0" y="0"/>
-          <a:chExt cx="0" cy="0"/>
-        </a:xfrm>
-      </p:grpSpPr>
-      <p:sp>
-        <p:nvSpPr>
-          <p:cNvPr id="2" name="Title 1"/>
-          <p:cNvSpPr>
-            <a:spLocks noGrp="1"/>
-          </p:cNvSpPr>
-          <p:nvPr>
-            <p:ph type="title"/>
-          </p:nvPr>
-        </p:nvSpPr>
-        <p:spPr/>
-        <p:txBody>
-          <a:bodyPr/>
-          <a:lstStyle/>
-          <a:p>
-            <a:r>
-              <a:rPr lang="en-CA" b="1" dirty="0" smtClean="0"/>
-              <a:t>Find out why bug exist</a:t>
-            </a:r>
-            <a:endParaRPr lang="en-CA" b="1" dirty="0"/>
-          </a:p>
-        </p:txBody>
-      </p:sp>
-      <p:sp>
-        <p:nvSpPr>
-          <p:cNvPr id="3" name="Content Placeholder 2"/>
-          <p:cNvSpPr>
-            <a:spLocks noGrp="1"/>
-          </p:cNvSpPr>
-          <p:nvPr>
-            <p:ph idx="1"/>
-          </p:nvPr>
-        </p:nvSpPr>
-        <p:spPr/>
-        <p:txBody>
-          <a:bodyPr/>
-          <a:lstStyle/>
-          <a:p>
-            <a:r>
-              <a:rPr lang="en-CA" dirty="0" smtClean="0"/>
-              <a:t>Steps to find </a:t>
-            </a:r>
-          </a:p>
-          <a:p>
-            <a:pPr lvl="1"/>
-            <a:r>
-              <a:rPr lang="en-CA" dirty="0" smtClean="0"/>
-              <a:t> Get an ACCOUNT SID and phone number from </a:t>
-            </a:r>
-            <a:r>
-              <a:rPr lang="en-CA" dirty="0" err="1" smtClean="0"/>
-              <a:t>Twilio</a:t>
-            </a:r>
-            <a:r>
-              <a:rPr lang="en-CA" dirty="0" smtClean="0"/>
-              <a:t> </a:t>
-            </a:r>
-          </a:p>
-          <a:p>
-            <a:pPr lvl="1"/>
-            <a:r>
-              <a:rPr lang="en-CA" dirty="0" smtClean="0"/>
-              <a:t>Make a new project and add </a:t>
-            </a:r>
-            <a:r>
-              <a:rPr lang="en-CA" dirty="0" err="1" smtClean="0"/>
-              <a:t>twillio</a:t>
-            </a:r>
-            <a:r>
-              <a:rPr lang="en-CA" dirty="0" smtClean="0"/>
-              <a:t> </a:t>
-            </a:r>
-            <a:r>
-              <a:rPr lang="en-CA" dirty="0" err="1" smtClean="0"/>
-              <a:t>NuGet</a:t>
-            </a:r>
-            <a:r>
-              <a:rPr lang="en-CA" dirty="0" smtClean="0"/>
-              <a:t> </a:t>
-            </a:r>
-          </a:p>
-          <a:p>
-            <a:pPr lvl="1"/>
-            <a:r>
-              <a:rPr lang="en-CA" dirty="0" smtClean="0"/>
-              <a:t>Writing the code to call or message </a:t>
-            </a:r>
-          </a:p>
-          <a:p>
-            <a:pPr lvl="1"/>
-            <a:r>
-              <a:rPr lang="en-CA" dirty="0" smtClean="0"/>
-              <a:t>Build and run </a:t>
-            </a:r>
-          </a:p>
-          <a:p>
-            <a:pPr lvl="1"/>
-            <a:r>
-              <a:rPr lang="en-CA" dirty="0" smtClean="0"/>
-              <a:t>Trace code and finding issue</a:t>
-            </a:r>
-          </a:p>
-          <a:p>
-            <a:pPr lvl="1"/>
-            <a:r>
-              <a:rPr lang="en-CA" dirty="0" smtClean="0"/>
-              <a:t>You can see these steps in following images </a:t>
-            </a:r>
-          </a:p>
-          <a:p>
-            <a:pPr lvl="1"/>
-            <a:endParaRPr lang="en-CA" dirty="0" smtClean="0"/>
-          </a:p>
-          <a:p>
-            <a:pPr lvl="1"/>
-            <a:endParaRPr lang="en-CA" dirty="0"/>
-          </a:p>
-        </p:txBody>
-      </p:sp>
-    </p:spTree>
-  </p:cSld>
-  <p:clrMapOvr>
-    <a:masterClrMapping/>
-  </p:clrMapOvr>
-</p:sld>
-</file>
-
-<file path=ppt/slides/slide8.xml><?xml version="1.0" encoding="utf-8"?>
 <p:sld xmlns:a="http://schemas.openxmlformats.org/drawingml/2006/main" xmlns:r="http://schemas.openxmlformats.org/officeDocument/2006/relationships" xmlns:p="http://schemas.openxmlformats.org/presentationml/2006/main">
   <p:cSld>
     <p:spTree>
@@ -5036,10 +4976,17 @@
   <p:clrMapOvr>
     <a:masterClrMapping/>
   </p:clrMapOvr>
+  <p:timing>
+    <p:tnLst>
+      <p:par>
+        <p:cTn id="1" dur="indefinite" restart="never" nodeType="tmRoot"/>
+      </p:par>
+    </p:tnLst>
+  </p:timing>
 </p:sld>
 </file>
 
-<file path=ppt/slides/slide9.xml><?xml version="1.0" encoding="utf-8"?>
+<file path=ppt/slides/slide8.xml><?xml version="1.0" encoding="utf-8"?>
 <p:sld xmlns:a="http://schemas.openxmlformats.org/drawingml/2006/main" xmlns:r="http://schemas.openxmlformats.org/officeDocument/2006/relationships" xmlns:p="http://schemas.openxmlformats.org/presentationml/2006/main">
   <p:cSld>
     <p:spTree>
@@ -5121,6 +5068,132 @@
   <p:clrMapOvr>
     <a:masterClrMapping/>
   </p:clrMapOvr>
+  <p:timing>
+    <p:tnLst>
+      <p:par>
+        <p:cTn id="1" dur="indefinite" restart="never" nodeType="tmRoot"/>
+      </p:par>
+    </p:tnLst>
+  </p:timing>
+</p:sld>
+</file>
+
+<file path=ppt/slides/slide9.xml><?xml version="1.0" encoding="utf-8"?>
+<p:sld xmlns:a="http://schemas.openxmlformats.org/drawingml/2006/main" xmlns:r="http://schemas.openxmlformats.org/officeDocument/2006/relationships" xmlns:p="http://schemas.openxmlformats.org/presentationml/2006/main">
+  <p:cSld>
+    <p:spTree>
+      <p:nvGrpSpPr>
+        <p:cNvPr id="1" name=""/>
+        <p:cNvGrpSpPr/>
+        <p:nvPr/>
+      </p:nvGrpSpPr>
+      <p:grpSpPr>
+        <a:xfrm>
+          <a:off x="0" y="0"/>
+          <a:ext cx="0" cy="0"/>
+          <a:chOff x="0" y="0"/>
+          <a:chExt cx="0" cy="0"/>
+        </a:xfrm>
+      </p:grpSpPr>
+      <p:sp>
+        <p:nvSpPr>
+          <p:cNvPr id="2" name="Title 1"/>
+          <p:cNvSpPr>
+            <a:spLocks noGrp="1"/>
+          </p:cNvSpPr>
+          <p:nvPr>
+            <p:ph type="title"/>
+          </p:nvPr>
+        </p:nvSpPr>
+        <p:spPr/>
+        <p:txBody>
+          <a:bodyPr>
+            <a:normAutofit fontScale="90000"/>
+          </a:bodyPr>
+          <a:lstStyle/>
+          <a:p>
+            <a:r>
+              <a:rPr lang="en-CA" b="1" dirty="0" smtClean="0"/>
+              <a:t>First Bug :</a:t>
+            </a:r>
+            <a:r>
+              <a:rPr lang="en-CA" dirty="0" smtClean="0"/>
+              <a:t/>
+            </a:r>
+            <a:br>
+              <a:rPr lang="en-CA" dirty="0" smtClean="0"/>
+            </a:br>
+            <a:r>
+              <a:rPr lang="en-CA" b="1" dirty="0" smtClean="0"/>
+              <a:t>code of using </a:t>
+            </a:r>
+            <a:r>
+              <a:rPr lang="en-CA" b="1" dirty="0" err="1" smtClean="0"/>
+              <a:t>Twilio</a:t>
+            </a:r>
+            <a:r>
+              <a:rPr lang="en-CA" b="1" dirty="0" smtClean="0"/>
+              <a:t> </a:t>
+            </a:r>
+            <a:r>
+              <a:rPr lang="en-CA" b="1" dirty="0" err="1" smtClean="0"/>
+              <a:t>api</a:t>
+            </a:r>
+            <a:r>
+              <a:rPr lang="en-CA" b="1" dirty="0" smtClean="0"/>
+              <a:t> send massage </a:t>
+            </a:r>
+            <a:endParaRPr lang="en-CA" b="1" dirty="0"/>
+          </a:p>
+        </p:txBody>
+      </p:sp>
+      <p:pic>
+        <p:nvPicPr>
+          <p:cNvPr id="1028" name="Picture 4"/>
+          <p:cNvPicPr>
+            <a:picLocks noGrp="1" noChangeAspect="1" noChangeArrowheads="1"/>
+          </p:cNvPicPr>
+          <p:nvPr>
+            <p:ph idx="1"/>
+          </p:nvPr>
+        </p:nvPicPr>
+        <p:blipFill>
+          <a:blip r:embed="rId2"/>
+          <a:srcRect/>
+          <a:stretch>
+            <a:fillRect/>
+          </a:stretch>
+        </p:blipFill>
+        <p:spPr bwMode="auto">
+          <a:xfrm>
+            <a:off x="1104900" y="1600994"/>
+            <a:ext cx="6934200" cy="4524375"/>
+          </a:xfrm>
+          <a:prstGeom prst="rect">
+            <a:avLst/>
+          </a:prstGeom>
+          <a:noFill/>
+          <a:ln w="9525">
+            <a:noFill/>
+            <a:miter lim="800000"/>
+            <a:headEnd/>
+            <a:tailEnd/>
+          </a:ln>
+          <a:effectLst/>
+        </p:spPr>
+      </p:pic>
+    </p:spTree>
+  </p:cSld>
+  <p:clrMapOvr>
+    <a:masterClrMapping/>
+  </p:clrMapOvr>
+  <p:timing>
+    <p:tnLst>
+      <p:par>
+        <p:cTn id="1" dur="indefinite" restart="never" nodeType="tmRoot"/>
+      </p:par>
+    </p:tnLst>
+  </p:timing>
 </p:sld>
 </file>
 

</xml_diff>

<commit_message>
Third bug is fixed
"filter subaccounts list by status " as an overload is added
</commit_message>
<xml_diff>
--- a/ClassWorkReports/Twilio_sharpBugFixing .pptx
+++ b/ClassWorkReports/Twilio_sharpBugFixing .pptx
@@ -306,7 +306,7 @@
             <a:fld id="{1D8BD707-D9CF-40AE-B4C6-C98DA3205C09}" type="datetimeFigureOut">
               <a:rPr lang="en-US" smtClean="0"/>
               <a:pPr/>
-              <a:t>11/13/2013</a:t>
+              <a:t>11/17/2013</a:t>
             </a:fld>
             <a:endParaRPr lang="en-US"/>
           </a:p>
@@ -473,7 +473,7 @@
             <a:fld id="{1D8BD707-D9CF-40AE-B4C6-C98DA3205C09}" type="datetimeFigureOut">
               <a:rPr lang="en-US" smtClean="0"/>
               <a:pPr/>
-              <a:t>11/13/2013</a:t>
+              <a:t>11/17/2013</a:t>
             </a:fld>
             <a:endParaRPr lang="en-US"/>
           </a:p>
@@ -650,7 +650,7 @@
             <a:fld id="{1D8BD707-D9CF-40AE-B4C6-C98DA3205C09}" type="datetimeFigureOut">
               <a:rPr lang="en-US" smtClean="0"/>
               <a:pPr/>
-              <a:t>11/13/2013</a:t>
+              <a:t>11/17/2013</a:t>
             </a:fld>
             <a:endParaRPr lang="en-US"/>
           </a:p>
@@ -817,7 +817,7 @@
             <a:fld id="{1D8BD707-D9CF-40AE-B4C6-C98DA3205C09}" type="datetimeFigureOut">
               <a:rPr lang="en-US" smtClean="0"/>
               <a:pPr/>
-              <a:t>11/13/2013</a:t>
+              <a:t>11/17/2013</a:t>
             </a:fld>
             <a:endParaRPr lang="en-US"/>
           </a:p>
@@ -1060,7 +1060,7 @@
             <a:fld id="{1D8BD707-D9CF-40AE-B4C6-C98DA3205C09}" type="datetimeFigureOut">
               <a:rPr lang="en-US" smtClean="0"/>
               <a:pPr/>
-              <a:t>11/13/2013</a:t>
+              <a:t>11/17/2013</a:t>
             </a:fld>
             <a:endParaRPr lang="en-US"/>
           </a:p>
@@ -1345,7 +1345,7 @@
             <a:fld id="{1D8BD707-D9CF-40AE-B4C6-C98DA3205C09}" type="datetimeFigureOut">
               <a:rPr lang="en-US" smtClean="0"/>
               <a:pPr/>
-              <a:t>11/13/2013</a:t>
+              <a:t>11/17/2013</a:t>
             </a:fld>
             <a:endParaRPr lang="en-US"/>
           </a:p>
@@ -1764,7 +1764,7 @@
             <a:fld id="{1D8BD707-D9CF-40AE-B4C6-C98DA3205C09}" type="datetimeFigureOut">
               <a:rPr lang="en-US" smtClean="0"/>
               <a:pPr/>
-              <a:t>11/13/2013</a:t>
+              <a:t>11/17/2013</a:t>
             </a:fld>
             <a:endParaRPr lang="en-US"/>
           </a:p>
@@ -1879,7 +1879,7 @@
             <a:fld id="{1D8BD707-D9CF-40AE-B4C6-C98DA3205C09}" type="datetimeFigureOut">
               <a:rPr lang="en-US" smtClean="0"/>
               <a:pPr/>
-              <a:t>11/13/2013</a:t>
+              <a:t>11/17/2013</a:t>
             </a:fld>
             <a:endParaRPr lang="en-US"/>
           </a:p>
@@ -1971,7 +1971,7 @@
             <a:fld id="{1D8BD707-D9CF-40AE-B4C6-C98DA3205C09}" type="datetimeFigureOut">
               <a:rPr lang="en-US" smtClean="0"/>
               <a:pPr/>
-              <a:t>11/13/2013</a:t>
+              <a:t>11/17/2013</a:t>
             </a:fld>
             <a:endParaRPr lang="en-US"/>
           </a:p>
@@ -2245,7 +2245,7 @@
             <a:fld id="{1D8BD707-D9CF-40AE-B4C6-C98DA3205C09}" type="datetimeFigureOut">
               <a:rPr lang="en-US" smtClean="0"/>
               <a:pPr/>
-              <a:t>11/13/2013</a:t>
+              <a:t>11/17/2013</a:t>
             </a:fld>
             <a:endParaRPr lang="en-US"/>
           </a:p>
@@ -2495,7 +2495,7 @@
             <a:fld id="{1D8BD707-D9CF-40AE-B4C6-C98DA3205C09}" type="datetimeFigureOut">
               <a:rPr lang="en-US" smtClean="0"/>
               <a:pPr/>
-              <a:t>11/13/2013</a:t>
+              <a:t>11/17/2013</a:t>
             </a:fld>
             <a:endParaRPr lang="en-US"/>
           </a:p>
@@ -2705,7 +2705,7 @@
             <a:fld id="{1D8BD707-D9CF-40AE-B4C6-C98DA3205C09}" type="datetimeFigureOut">
               <a:rPr lang="en-US" smtClean="0"/>
               <a:pPr/>
-              <a:t>11/13/2013</a:t>
+              <a:t>11/17/2013</a:t>
             </a:fld>
             <a:endParaRPr lang="en-US"/>
           </a:p>
@@ -4218,9 +4218,25 @@
           </a:p>
           <a:p>
             <a:r>
-              <a:rPr lang="en-CA" dirty="0" smtClean="0"/>
-              <a:t>https://www.twilio.com/docs/api/rest/queue</a:t>
-            </a:r>
+              <a:rPr lang="en-CA" dirty="0" smtClean="0">
+                <a:hlinkClick r:id="rId4"/>
+              </a:rPr>
+              <a:t>https://</a:t>
+            </a:r>
+            <a:r>
+              <a:rPr lang="en-CA" dirty="0" smtClean="0">
+                <a:hlinkClick r:id="rId4"/>
+              </a:rPr>
+              <a:t>www.twilio.com/docs/api/rest/queue</a:t>
+            </a:r>
+            <a:endParaRPr lang="en-CA" dirty="0" smtClean="0"/>
+          </a:p>
+          <a:p>
+            <a:r>
+              <a:rPr lang="en-CA" dirty="0" smtClean="0"/>
+              <a:t>https://www.twilio.com/docs/api/rest/subaccounts#listing-subaccounts-example-2</a:t>
+            </a:r>
+            <a:endParaRPr lang="en-CA" dirty="0" smtClean="0"/>
           </a:p>
           <a:p>
             <a:endParaRPr lang="en-CA" dirty="0"/>

</xml_diff>